<commit_message>
pages "Nexus2Apps-CGM1" and  "Nexus2Apps-CGM1-KAD"
</commit_message>
<xml_diff>
--- a/diagrams/diagram PyCGM2.pptx
+++ b/diagrams/diagram PyCGM2.pptx
@@ -8,6 +8,7 @@
     <p:sldId id="256" r:id="rId2"/>
     <p:sldId id="257" r:id="rId3"/>
     <p:sldId id="258" r:id="rId4"/>
+    <p:sldId id="259" r:id="rId5"/>
   </p:sldIdLst>
   <p:sldSz cx="6858000" cy="9906000" type="A4"/>
   <p:notesSz cx="6858000" cy="9144000"/>
@@ -290,7 +291,7 @@
           <a:p>
             <a:fld id="{F1B5D7F9-D416-47FB-B327-8C4F0F938FFF}" type="datetimeFigureOut">
               <a:rPr lang="fr-FR" smtClean="0"/>
-              <a:t>17/12/2016</a:t>
+              <a:t>19/12/2016</a:t>
             </a:fld>
             <a:endParaRPr lang="fr-FR"/>
           </a:p>
@@ -460,7 +461,7 @@
           <a:p>
             <a:fld id="{F1B5D7F9-D416-47FB-B327-8C4F0F938FFF}" type="datetimeFigureOut">
               <a:rPr lang="fr-FR" smtClean="0"/>
-              <a:t>17/12/2016</a:t>
+              <a:t>19/12/2016</a:t>
             </a:fld>
             <a:endParaRPr lang="fr-FR"/>
           </a:p>
@@ -640,7 +641,7 @@
           <a:p>
             <a:fld id="{F1B5D7F9-D416-47FB-B327-8C4F0F938FFF}" type="datetimeFigureOut">
               <a:rPr lang="fr-FR" smtClean="0"/>
-              <a:t>17/12/2016</a:t>
+              <a:t>19/12/2016</a:t>
             </a:fld>
             <a:endParaRPr lang="fr-FR"/>
           </a:p>
@@ -810,7 +811,7 @@
           <a:p>
             <a:fld id="{F1B5D7F9-D416-47FB-B327-8C4F0F938FFF}" type="datetimeFigureOut">
               <a:rPr lang="fr-FR" smtClean="0"/>
-              <a:t>17/12/2016</a:t>
+              <a:t>19/12/2016</a:t>
             </a:fld>
             <a:endParaRPr lang="fr-FR"/>
           </a:p>
@@ -1056,7 +1057,7 @@
           <a:p>
             <a:fld id="{F1B5D7F9-D416-47FB-B327-8C4F0F938FFF}" type="datetimeFigureOut">
               <a:rPr lang="fr-FR" smtClean="0"/>
-              <a:t>17/12/2016</a:t>
+              <a:t>19/12/2016</a:t>
             </a:fld>
             <a:endParaRPr lang="fr-FR"/>
           </a:p>
@@ -1344,7 +1345,7 @@
           <a:p>
             <a:fld id="{F1B5D7F9-D416-47FB-B327-8C4F0F938FFF}" type="datetimeFigureOut">
               <a:rPr lang="fr-FR" smtClean="0"/>
-              <a:t>17/12/2016</a:t>
+              <a:t>19/12/2016</a:t>
             </a:fld>
             <a:endParaRPr lang="fr-FR"/>
           </a:p>
@@ -1766,7 +1767,7 @@
           <a:p>
             <a:fld id="{F1B5D7F9-D416-47FB-B327-8C4F0F938FFF}" type="datetimeFigureOut">
               <a:rPr lang="fr-FR" smtClean="0"/>
-              <a:t>17/12/2016</a:t>
+              <a:t>19/12/2016</a:t>
             </a:fld>
             <a:endParaRPr lang="fr-FR"/>
           </a:p>
@@ -1884,7 +1885,7 @@
           <a:p>
             <a:fld id="{F1B5D7F9-D416-47FB-B327-8C4F0F938FFF}" type="datetimeFigureOut">
               <a:rPr lang="fr-FR" smtClean="0"/>
-              <a:t>17/12/2016</a:t>
+              <a:t>19/12/2016</a:t>
             </a:fld>
             <a:endParaRPr lang="fr-FR"/>
           </a:p>
@@ -1979,7 +1980,7 @@
           <a:p>
             <a:fld id="{F1B5D7F9-D416-47FB-B327-8C4F0F938FFF}" type="datetimeFigureOut">
               <a:rPr lang="fr-FR" smtClean="0"/>
-              <a:t>17/12/2016</a:t>
+              <a:t>19/12/2016</a:t>
             </a:fld>
             <a:endParaRPr lang="fr-FR"/>
           </a:p>
@@ -2256,7 +2257,7 @@
           <a:p>
             <a:fld id="{F1B5D7F9-D416-47FB-B327-8C4F0F938FFF}" type="datetimeFigureOut">
               <a:rPr lang="fr-FR" smtClean="0"/>
-              <a:t>17/12/2016</a:t>
+              <a:t>19/12/2016</a:t>
             </a:fld>
             <a:endParaRPr lang="fr-FR"/>
           </a:p>
@@ -2509,7 +2510,7 @@
           <a:p>
             <a:fld id="{F1B5D7F9-D416-47FB-B327-8C4F0F938FFF}" type="datetimeFigureOut">
               <a:rPr lang="fr-FR" smtClean="0"/>
-              <a:t>17/12/2016</a:t>
+              <a:t>19/12/2016</a:t>
             </a:fld>
             <a:endParaRPr lang="fr-FR"/>
           </a:p>
@@ -2722,7 +2723,7 @@
           <a:p>
             <a:fld id="{F1B5D7F9-D416-47FB-B327-8C4F0F938FFF}" type="datetimeFigureOut">
               <a:rPr lang="fr-FR" smtClean="0"/>
-              <a:t>17/12/2016</a:t>
+              <a:t>19/12/2016</a:t>
             </a:fld>
             <a:endParaRPr lang="fr-FR"/>
           </a:p>
@@ -9469,6 +9470,7 @@
               <a:solidFill>
                 <a:schemeClr val="tx1"/>
               </a:solidFill>
+              <a:prstDash val="sysDot"/>
             </a:ln>
           </p:spPr>
           <p:style>
@@ -9556,6 +9558,7 @@
               <a:solidFill>
                 <a:schemeClr val="tx1"/>
               </a:solidFill>
+              <a:prstDash val="sysDot"/>
             </a:ln>
           </p:spPr>
           <p:style>
@@ -9591,6 +9594,7 @@
               <a:solidFill>
                 <a:schemeClr val="tx1"/>
               </a:solidFill>
+              <a:prstDash val="sysDot"/>
             </a:ln>
           </p:spPr>
           <p:style>
@@ -18069,6 +18073,902 @@
 </p:sld>
 </file>
 
+<file path=ppt/slides/slide4.xml><?xml version="1.0" encoding="utf-8"?>
+<p:sld xmlns:a="http://schemas.openxmlformats.org/drawingml/2006/main" xmlns:r="http://schemas.openxmlformats.org/officeDocument/2006/relationships" xmlns:p="http://schemas.openxmlformats.org/presentationml/2006/main">
+  <p:cSld>
+    <p:spTree>
+      <p:nvGrpSpPr>
+        <p:cNvPr id="1" name=""/>
+        <p:cNvGrpSpPr/>
+        <p:nvPr/>
+      </p:nvGrpSpPr>
+      <p:grpSpPr>
+        <a:xfrm>
+          <a:off x="0" y="0"/>
+          <a:ext cx="0" cy="0"/>
+          <a:chOff x="0" y="0"/>
+          <a:chExt cx="0" cy="0"/>
+        </a:xfrm>
+      </p:grpSpPr>
+      <p:grpSp>
+        <p:nvGrpSpPr>
+          <p:cNvPr id="29" name="Group 28"/>
+          <p:cNvGrpSpPr/>
+          <p:nvPr/>
+        </p:nvGrpSpPr>
+        <p:grpSpPr>
+          <a:xfrm>
+            <a:off x="1072927" y="2860646"/>
+            <a:ext cx="4695825" cy="2419910"/>
+            <a:chOff x="1072927" y="2860646"/>
+            <a:chExt cx="4695825" cy="2419910"/>
+          </a:xfrm>
+        </p:grpSpPr>
+        <p:sp>
+          <p:nvSpPr>
+            <p:cNvPr id="21" name="Rectangle 20"/>
+            <p:cNvSpPr/>
+            <p:nvPr/>
+          </p:nvSpPr>
+          <p:spPr>
+            <a:xfrm>
+              <a:off x="2945275" y="4061037"/>
+              <a:ext cx="1247238" cy="1190547"/>
+            </a:xfrm>
+            <a:prstGeom prst="rect">
+              <a:avLst/>
+            </a:prstGeom>
+            <a:solidFill>
+              <a:srgbClr val="4F81BD">
+                <a:alpha val="21961"/>
+              </a:srgbClr>
+            </a:solidFill>
+            <a:ln>
+              <a:noFill/>
+            </a:ln>
+          </p:spPr>
+          <p:style>
+            <a:lnRef idx="2">
+              <a:schemeClr val="accent1">
+                <a:shade val="50000"/>
+              </a:schemeClr>
+            </a:lnRef>
+            <a:fillRef idx="1">
+              <a:schemeClr val="accent1"/>
+            </a:fillRef>
+            <a:effectRef idx="0">
+              <a:schemeClr val="accent1"/>
+            </a:effectRef>
+            <a:fontRef idx="minor">
+              <a:schemeClr val="lt1"/>
+            </a:fontRef>
+          </p:style>
+          <p:txBody>
+            <a:bodyPr rtlCol="0" anchor="ctr"/>
+            <a:lstStyle/>
+            <a:p>
+              <a:pPr algn="ctr"/>
+              <a:endParaRPr lang="fr-FR"/>
+            </a:p>
+          </p:txBody>
+        </p:sp>
+        <p:sp>
+          <p:nvSpPr>
+            <p:cNvPr id="19" name="Rectangle 18"/>
+            <p:cNvSpPr/>
+            <p:nvPr/>
+          </p:nvSpPr>
+          <p:spPr>
+            <a:xfrm>
+              <a:off x="1072927" y="4090009"/>
+              <a:ext cx="1642528" cy="1190547"/>
+            </a:xfrm>
+            <a:prstGeom prst="rect">
+              <a:avLst/>
+            </a:prstGeom>
+            <a:solidFill>
+              <a:srgbClr val="FFFF00">
+                <a:alpha val="21961"/>
+              </a:srgbClr>
+            </a:solidFill>
+            <a:ln>
+              <a:noFill/>
+            </a:ln>
+          </p:spPr>
+          <p:style>
+            <a:lnRef idx="2">
+              <a:schemeClr val="accent1">
+                <a:shade val="50000"/>
+              </a:schemeClr>
+            </a:lnRef>
+            <a:fillRef idx="1">
+              <a:schemeClr val="accent1"/>
+            </a:fillRef>
+            <a:effectRef idx="0">
+              <a:schemeClr val="accent1"/>
+            </a:effectRef>
+            <a:fontRef idx="minor">
+              <a:schemeClr val="lt1"/>
+            </a:fontRef>
+          </p:style>
+          <p:txBody>
+            <a:bodyPr rtlCol="0" anchor="ctr"/>
+            <a:lstStyle/>
+            <a:p>
+              <a:pPr algn="ctr"/>
+              <a:endParaRPr lang="fr-FR"/>
+            </a:p>
+          </p:txBody>
+        </p:sp>
+        <p:sp>
+          <p:nvSpPr>
+            <p:cNvPr id="7" name="TextBox 6"/>
+            <p:cNvSpPr txBox="1"/>
+            <p:nvPr/>
+          </p:nvSpPr>
+          <p:spPr>
+            <a:xfrm>
+              <a:off x="1213760" y="4107954"/>
+              <a:ext cx="1404102" cy="461665"/>
+            </a:xfrm>
+            <a:prstGeom prst="rect">
+              <a:avLst/>
+            </a:prstGeom>
+            <a:noFill/>
+          </p:spPr>
+          <p:txBody>
+            <a:bodyPr wrap="none" rtlCol="0">
+              <a:spAutoFit/>
+            </a:bodyPr>
+            <a:lstStyle/>
+            <a:p>
+              <a:pPr algn="ctr"/>
+              <a:r>
+                <a:rPr lang="fr-FR" sz="1200" b="1" dirty="0" smtClean="0"/>
+                <a:t>RECONSTRUCT</a:t>
+              </a:r>
+            </a:p>
+            <a:p>
+              <a:pPr algn="ctr"/>
+              <a:r>
+                <a:rPr lang="fr-FR" sz="1200" dirty="0" smtClean="0"/>
+                <a:t>Option : Calibration</a:t>
+              </a:r>
+              <a:endParaRPr lang="fr-FR" sz="1200" dirty="0"/>
+            </a:p>
+          </p:txBody>
+        </p:sp>
+        <p:sp>
+          <p:nvSpPr>
+            <p:cNvPr id="8" name="TextBox 7"/>
+            <p:cNvSpPr txBox="1"/>
+            <p:nvPr/>
+          </p:nvSpPr>
+          <p:spPr>
+            <a:xfrm>
+              <a:off x="3017169" y="4098429"/>
+              <a:ext cx="1124731" cy="276999"/>
+            </a:xfrm>
+            <a:prstGeom prst="rect">
+              <a:avLst/>
+            </a:prstGeom>
+            <a:noFill/>
+          </p:spPr>
+          <p:txBody>
+            <a:bodyPr wrap="none" rtlCol="0">
+              <a:spAutoFit/>
+            </a:bodyPr>
+            <a:lstStyle/>
+            <a:p>
+              <a:r>
+                <a:rPr lang="fr-FR" sz="1200" b="1" dirty="0" smtClean="0"/>
+                <a:t>RECONSTRUCT</a:t>
+              </a:r>
+              <a:endParaRPr lang="fr-FR" sz="1200" b="1" dirty="0"/>
+            </a:p>
+          </p:txBody>
+        </p:sp>
+        <p:sp>
+          <p:nvSpPr>
+            <p:cNvPr id="11" name="Notched Right Arrow 10"/>
+            <p:cNvSpPr/>
+            <p:nvPr/>
+          </p:nvSpPr>
+          <p:spPr>
+            <a:xfrm>
+              <a:off x="1196752" y="2860646"/>
+              <a:ext cx="4572000" cy="1219200"/>
+            </a:xfrm>
+            <a:prstGeom prst="notchedRightArrow">
+              <a:avLst/>
+            </a:prstGeom>
+          </p:spPr>
+          <p:style>
+            <a:lnRef idx="0">
+              <a:schemeClr val="accent1">
+                <a:hueOff val="0"/>
+                <a:satOff val="0"/>
+                <a:lumOff val="0"/>
+                <a:alphaOff val="0"/>
+              </a:schemeClr>
+            </a:lnRef>
+            <a:fillRef idx="1">
+              <a:schemeClr val="accent1">
+                <a:tint val="40000"/>
+                <a:hueOff val="0"/>
+                <a:satOff val="0"/>
+                <a:lumOff val="0"/>
+                <a:alphaOff val="0"/>
+              </a:schemeClr>
+            </a:fillRef>
+            <a:effectRef idx="0">
+              <a:schemeClr val="accent1">
+                <a:tint val="40000"/>
+                <a:hueOff val="0"/>
+                <a:satOff val="0"/>
+                <a:lumOff val="0"/>
+                <a:alphaOff val="0"/>
+              </a:schemeClr>
+            </a:effectRef>
+            <a:fontRef idx="minor">
+              <a:schemeClr val="dk1">
+                <a:hueOff val="0"/>
+                <a:satOff val="0"/>
+                <a:lumOff val="0"/>
+                <a:alphaOff val="0"/>
+              </a:schemeClr>
+            </a:fontRef>
+          </p:style>
+        </p:sp>
+        <p:sp>
+          <p:nvSpPr>
+            <p:cNvPr id="12" name="Oval 11"/>
+            <p:cNvSpPr/>
+            <p:nvPr/>
+          </p:nvSpPr>
+          <p:spPr>
+            <a:xfrm>
+              <a:off x="1748700" y="3325466"/>
+              <a:ext cx="304800" cy="304800"/>
+            </a:xfrm>
+            <a:prstGeom prst="ellipse">
+              <a:avLst/>
+            </a:prstGeom>
+            <a:solidFill>
+              <a:schemeClr val="accent3"/>
+            </a:solidFill>
+          </p:spPr>
+          <p:style>
+            <a:lnRef idx="2">
+              <a:schemeClr val="lt1">
+                <a:hueOff val="0"/>
+                <a:satOff val="0"/>
+                <a:lumOff val="0"/>
+                <a:alphaOff val="0"/>
+              </a:schemeClr>
+            </a:lnRef>
+            <a:fillRef idx="1">
+              <a:schemeClr val="accent1">
+                <a:hueOff val="0"/>
+                <a:satOff val="0"/>
+                <a:lumOff val="0"/>
+                <a:alphaOff val="0"/>
+              </a:schemeClr>
+            </a:fillRef>
+            <a:effectRef idx="0">
+              <a:schemeClr val="accent1">
+                <a:hueOff val="0"/>
+                <a:satOff val="0"/>
+                <a:lumOff val="0"/>
+                <a:alphaOff val="0"/>
+              </a:schemeClr>
+            </a:effectRef>
+            <a:fontRef idx="minor">
+              <a:schemeClr val="lt1"/>
+            </a:fontRef>
+          </p:style>
+        </p:sp>
+        <p:sp>
+          <p:nvSpPr>
+            <p:cNvPr id="13" name="Oval 12"/>
+            <p:cNvSpPr/>
+            <p:nvPr/>
+          </p:nvSpPr>
+          <p:spPr>
+            <a:xfrm>
+              <a:off x="3415961" y="3317846"/>
+              <a:ext cx="304800" cy="304800"/>
+            </a:xfrm>
+            <a:prstGeom prst="ellipse">
+              <a:avLst/>
+            </a:prstGeom>
+          </p:spPr>
+          <p:style>
+            <a:lnRef idx="2">
+              <a:schemeClr val="lt1">
+                <a:hueOff val="0"/>
+                <a:satOff val="0"/>
+                <a:lumOff val="0"/>
+                <a:alphaOff val="0"/>
+              </a:schemeClr>
+            </a:lnRef>
+            <a:fillRef idx="1">
+              <a:schemeClr val="accent1">
+                <a:hueOff val="0"/>
+                <a:satOff val="0"/>
+                <a:lumOff val="0"/>
+                <a:alphaOff val="0"/>
+              </a:schemeClr>
+            </a:fillRef>
+            <a:effectRef idx="0">
+              <a:schemeClr val="accent1">
+                <a:hueOff val="0"/>
+                <a:satOff val="0"/>
+                <a:lumOff val="0"/>
+                <a:alphaOff val="0"/>
+              </a:schemeClr>
+            </a:effectRef>
+            <a:fontRef idx="minor">
+              <a:schemeClr val="lt1"/>
+            </a:fontRef>
+          </p:style>
+        </p:sp>
+        <p:sp>
+          <p:nvSpPr>
+            <p:cNvPr id="14" name="Oval 13"/>
+            <p:cNvSpPr/>
+            <p:nvPr/>
+          </p:nvSpPr>
+          <p:spPr>
+            <a:xfrm>
+              <a:off x="4554488" y="3317846"/>
+              <a:ext cx="304800" cy="304800"/>
+            </a:xfrm>
+            <a:prstGeom prst="ellipse">
+              <a:avLst/>
+            </a:prstGeom>
+          </p:spPr>
+          <p:style>
+            <a:lnRef idx="2">
+              <a:schemeClr val="lt1">
+                <a:hueOff val="0"/>
+                <a:satOff val="0"/>
+                <a:lumOff val="0"/>
+                <a:alphaOff val="0"/>
+              </a:schemeClr>
+            </a:lnRef>
+            <a:fillRef idx="1">
+              <a:schemeClr val="accent1">
+                <a:hueOff val="0"/>
+                <a:satOff val="0"/>
+                <a:lumOff val="0"/>
+                <a:alphaOff val="0"/>
+              </a:schemeClr>
+            </a:fillRef>
+            <a:effectRef idx="0">
+              <a:schemeClr val="accent1">
+                <a:hueOff val="0"/>
+                <a:satOff val="0"/>
+                <a:lumOff val="0"/>
+                <a:alphaOff val="0"/>
+              </a:schemeClr>
+            </a:effectRef>
+            <a:fontRef idx="minor">
+              <a:schemeClr val="lt1"/>
+            </a:fontRef>
+          </p:style>
+        </p:sp>
+        <p:sp>
+          <p:nvSpPr>
+            <p:cNvPr id="15" name="TextBox 14"/>
+            <p:cNvSpPr txBox="1"/>
+            <p:nvPr/>
+          </p:nvSpPr>
+          <p:spPr>
+            <a:xfrm>
+              <a:off x="1137755" y="4572670"/>
+              <a:ext cx="1327608" cy="707886"/>
+            </a:xfrm>
+            <a:prstGeom prst="rect">
+              <a:avLst/>
+            </a:prstGeom>
+            <a:noFill/>
+          </p:spPr>
+          <p:txBody>
+            <a:bodyPr wrap="none" rtlCol="0">
+              <a:spAutoFit/>
+            </a:bodyPr>
+            <a:lstStyle/>
+            <a:p>
+              <a:r>
+                <a:rPr lang="fr-FR" sz="1000" dirty="0" smtClean="0"/>
+                <a:t>New C3d</a:t>
+              </a:r>
+              <a:br>
+                <a:rPr lang="fr-FR" sz="1000" dirty="0" smtClean="0"/>
+              </a:br>
+              <a:r>
+                <a:rPr lang="fr-FR" sz="1000" dirty="0" smtClean="0"/>
+                <a:t>- </a:t>
+              </a:r>
+              <a:r>
+                <a:rPr lang="fr-FR" sz="1000" dirty="0" err="1" smtClean="0"/>
+                <a:t>Kinematics</a:t>
+              </a:r>
+              <a:r>
+                <a:rPr lang="fr-FR" sz="1000" dirty="0" smtClean="0"/>
+                <a:t> </a:t>
+              </a:r>
+              <a:r>
+                <a:rPr lang="fr-FR" sz="1000" dirty="0" err="1" smtClean="0"/>
+                <a:t>only</a:t>
+              </a:r>
+              <a:r>
+                <a:rPr lang="fr-FR" sz="1000" dirty="0" smtClean="0"/>
+                <a:t> </a:t>
+              </a:r>
+            </a:p>
+            <a:p>
+              <a:r>
+                <a:rPr lang="fr-FR" sz="1000" dirty="0" smtClean="0"/>
+                <a:t>(</a:t>
+              </a:r>
+              <a:r>
+                <a:rPr lang="fr-FR" sz="1000" dirty="0" err="1" smtClean="0"/>
+                <a:t>optional</a:t>
+              </a:r>
+              <a:r>
+                <a:rPr lang="fr-FR" sz="1000" dirty="0" smtClean="0"/>
+                <a:t>) </a:t>
+              </a:r>
+            </a:p>
+            <a:p>
+              <a:pPr marL="171450" indent="-171450">
+                <a:buFontTx/>
+                <a:buChar char="-"/>
+              </a:pPr>
+              <a:r>
+                <a:rPr lang="fr-FR" sz="1000" dirty="0" err="1" smtClean="0"/>
+                <a:t>Static</a:t>
+              </a:r>
+              <a:r>
+                <a:rPr lang="fr-FR" sz="1000" dirty="0" smtClean="0"/>
+                <a:t> angle profile</a:t>
+              </a:r>
+            </a:p>
+          </p:txBody>
+        </p:sp>
+        <p:sp>
+          <p:nvSpPr>
+            <p:cNvPr id="4" name="TextBox 3"/>
+            <p:cNvSpPr txBox="1"/>
+            <p:nvPr/>
+          </p:nvSpPr>
+          <p:spPr>
+            <a:xfrm>
+              <a:off x="1511649" y="3024816"/>
+              <a:ext cx="827471" cy="276999"/>
+            </a:xfrm>
+            <a:prstGeom prst="rect">
+              <a:avLst/>
+            </a:prstGeom>
+            <a:noFill/>
+          </p:spPr>
+          <p:txBody>
+            <a:bodyPr wrap="none" rtlCol="0">
+              <a:spAutoFit/>
+            </a:bodyPr>
+            <a:lstStyle/>
+            <a:p>
+              <a:r>
+                <a:rPr lang="fr-FR" sz="1200" dirty="0" err="1" smtClean="0"/>
+                <a:t>Static</a:t>
+              </a:r>
+              <a:r>
+                <a:rPr lang="fr-FR" sz="1200" dirty="0" smtClean="0"/>
+                <a:t> Trial</a:t>
+              </a:r>
+              <a:endParaRPr lang="fr-FR" sz="1200" dirty="0"/>
+            </a:p>
+          </p:txBody>
+        </p:sp>
+        <p:sp>
+          <p:nvSpPr>
+            <p:cNvPr id="5" name="Rectangle 4"/>
+            <p:cNvSpPr/>
+            <p:nvPr/>
+          </p:nvSpPr>
+          <p:spPr>
+            <a:xfrm>
+              <a:off x="3140968" y="3024816"/>
+              <a:ext cx="854786" cy="276999"/>
+            </a:xfrm>
+            <a:prstGeom prst="rect">
+              <a:avLst/>
+            </a:prstGeom>
+          </p:spPr>
+          <p:txBody>
+            <a:bodyPr wrap="none">
+              <a:spAutoFit/>
+            </a:bodyPr>
+            <a:lstStyle/>
+            <a:p>
+              <a:r>
+                <a:rPr lang="fr-FR" sz="1200" dirty="0" err="1" smtClean="0"/>
+                <a:t>Gait</a:t>
+              </a:r>
+              <a:r>
+                <a:rPr lang="fr-FR" sz="1200" dirty="0" smtClean="0"/>
+                <a:t> Trial 1</a:t>
+              </a:r>
+              <a:endParaRPr lang="fr-FR" sz="1200" dirty="0"/>
+            </a:p>
+          </p:txBody>
+        </p:sp>
+        <p:sp>
+          <p:nvSpPr>
+            <p:cNvPr id="17" name="Freeform 16"/>
+            <p:cNvSpPr/>
+            <p:nvPr/>
+          </p:nvSpPr>
+          <p:spPr>
+            <a:xfrm>
+              <a:off x="2041742" y="3469710"/>
+              <a:ext cx="1139869" cy="601249"/>
+            </a:xfrm>
+            <a:custGeom>
+              <a:avLst/>
+              <a:gdLst>
+                <a:gd name="connsiteX0" fmla="*/ 1139869 w 1139869"/>
+                <a:gd name="connsiteY0" fmla="*/ 601249 h 601249"/>
+                <a:gd name="connsiteX1" fmla="*/ 789140 w 1139869"/>
+                <a:gd name="connsiteY1" fmla="*/ 175364 h 601249"/>
+                <a:gd name="connsiteX2" fmla="*/ 0 w 1139869"/>
+                <a:gd name="connsiteY2" fmla="*/ 0 h 601249"/>
+                <a:gd name="connsiteX3" fmla="*/ 0 w 1139869"/>
+                <a:gd name="connsiteY3" fmla="*/ 0 h 601249"/>
+                <a:gd name="connsiteX4" fmla="*/ 0 w 1139869"/>
+                <a:gd name="connsiteY4" fmla="*/ 0 h 601249"/>
+              </a:gdLst>
+              <a:ahLst/>
+              <a:cxnLst>
+                <a:cxn ang="0">
+                  <a:pos x="connsiteX0" y="connsiteY0"/>
+                </a:cxn>
+                <a:cxn ang="0">
+                  <a:pos x="connsiteX1" y="connsiteY1"/>
+                </a:cxn>
+                <a:cxn ang="0">
+                  <a:pos x="connsiteX2" y="connsiteY2"/>
+                </a:cxn>
+                <a:cxn ang="0">
+                  <a:pos x="connsiteX3" y="connsiteY3"/>
+                </a:cxn>
+                <a:cxn ang="0">
+                  <a:pos x="connsiteX4" y="connsiteY4"/>
+                </a:cxn>
+              </a:cxnLst>
+              <a:rect l="l" t="t" r="r" b="b"/>
+              <a:pathLst>
+                <a:path w="1139869" h="601249">
+                  <a:moveTo>
+                    <a:pt x="1139869" y="601249"/>
+                  </a:moveTo>
+                  <a:cubicBezTo>
+                    <a:pt x="1059493" y="438410"/>
+                    <a:pt x="979118" y="275572"/>
+                    <a:pt x="789140" y="175364"/>
+                  </a:cubicBezTo>
+                  <a:cubicBezTo>
+                    <a:pt x="599162" y="75156"/>
+                    <a:pt x="0" y="0"/>
+                    <a:pt x="0" y="0"/>
+                  </a:cubicBezTo>
+                  <a:lnTo>
+                    <a:pt x="0" y="0"/>
+                  </a:lnTo>
+                  <a:lnTo>
+                    <a:pt x="0" y="0"/>
+                  </a:lnTo>
+                </a:path>
+              </a:pathLst>
+            </a:custGeom>
+            <a:noFill/>
+            <a:ln w="3175">
+              <a:prstDash val="sysDot"/>
+              <a:headEnd type="none" w="med" len="med"/>
+              <a:tailEnd type="arrow" w="med" len="med"/>
+            </a:ln>
+          </p:spPr>
+          <p:style>
+            <a:lnRef idx="2">
+              <a:schemeClr val="accent1">
+                <a:shade val="50000"/>
+              </a:schemeClr>
+            </a:lnRef>
+            <a:fillRef idx="1">
+              <a:schemeClr val="accent1"/>
+            </a:fillRef>
+            <a:effectRef idx="0">
+              <a:schemeClr val="accent1"/>
+            </a:effectRef>
+            <a:fontRef idx="minor">
+              <a:schemeClr val="lt1"/>
+            </a:fontRef>
+          </p:style>
+          <p:txBody>
+            <a:bodyPr rtlCol="0" anchor="ctr"/>
+            <a:lstStyle/>
+            <a:p>
+              <a:pPr algn="ctr"/>
+              <a:endParaRPr lang="fr-FR" i="1" dirty="0">
+                <a:solidFill>
+                  <a:sysClr val="windowText" lastClr="000000"/>
+                </a:solidFill>
+              </a:endParaRPr>
+            </a:p>
+          </p:txBody>
+        </p:sp>
+        <p:sp>
+          <p:nvSpPr>
+            <p:cNvPr id="18" name="Rectangle 17"/>
+            <p:cNvSpPr/>
+            <p:nvPr/>
+          </p:nvSpPr>
+          <p:spPr>
+            <a:xfrm>
+              <a:off x="2658782" y="3639017"/>
+              <a:ext cx="360996" cy="246221"/>
+            </a:xfrm>
+            <a:prstGeom prst="rect">
+              <a:avLst/>
+            </a:prstGeom>
+          </p:spPr>
+          <p:txBody>
+            <a:bodyPr wrap="none">
+              <a:spAutoFit/>
+            </a:bodyPr>
+            <a:lstStyle/>
+            <a:p>
+              <a:r>
+                <a:rPr lang="fr-FR" sz="1000" i="1" dirty="0">
+                  <a:solidFill>
+                    <a:sysClr val="windowText" lastClr="000000"/>
+                  </a:solidFill>
+                </a:rPr>
+                <a:t>call</a:t>
+              </a:r>
+              <a:endParaRPr lang="fr-FR" sz="1000" dirty="0"/>
+            </a:p>
+          </p:txBody>
+        </p:sp>
+        <p:sp>
+          <p:nvSpPr>
+            <p:cNvPr id="20" name="TextBox 19"/>
+            <p:cNvSpPr txBox="1"/>
+            <p:nvPr/>
+          </p:nvSpPr>
+          <p:spPr>
+            <a:xfrm>
+              <a:off x="3067782" y="4605704"/>
+              <a:ext cx="854721" cy="553998"/>
+            </a:xfrm>
+            <a:prstGeom prst="rect">
+              <a:avLst/>
+            </a:prstGeom>
+            <a:noFill/>
+          </p:spPr>
+          <p:txBody>
+            <a:bodyPr wrap="none" rtlCol="0">
+              <a:spAutoFit/>
+            </a:bodyPr>
+            <a:lstStyle/>
+            <a:p>
+              <a:r>
+                <a:rPr lang="fr-FR" sz="1000" dirty="0" smtClean="0"/>
+                <a:t>New C3d </a:t>
+              </a:r>
+            </a:p>
+            <a:p>
+              <a:r>
+                <a:rPr lang="fr-FR" sz="1000" dirty="0" smtClean="0"/>
+                <a:t>(</a:t>
+              </a:r>
+              <a:r>
+                <a:rPr lang="fr-FR" sz="1000" dirty="0" err="1" smtClean="0"/>
+                <a:t>optional</a:t>
+              </a:r>
+              <a:r>
+                <a:rPr lang="fr-FR" sz="1000" dirty="0" smtClean="0"/>
+                <a:t>) </a:t>
+              </a:r>
+            </a:p>
+            <a:p>
+              <a:pPr marL="171450" indent="-171450">
+                <a:buFontTx/>
+                <a:buChar char="-"/>
+              </a:pPr>
+              <a:r>
+                <a:rPr lang="fr-FR" sz="1000" dirty="0" err="1" smtClean="0"/>
+                <a:t>Gait</a:t>
+              </a:r>
+              <a:r>
+                <a:rPr lang="fr-FR" sz="1000" dirty="0" smtClean="0"/>
+                <a:t> Plots</a:t>
+              </a:r>
+            </a:p>
+          </p:txBody>
+        </p:sp>
+        <p:cxnSp>
+          <p:nvCxnSpPr>
+            <p:cNvPr id="23" name="Straight Arrow Connector 22"/>
+            <p:cNvCxnSpPr>
+              <a:stCxn id="13" idx="4"/>
+              <a:endCxn id="21" idx="0"/>
+            </p:cNvCxnSpPr>
+            <p:nvPr/>
+          </p:nvCxnSpPr>
+          <p:spPr>
+            <a:xfrm>
+              <a:off x="3568361" y="3622646"/>
+              <a:ext cx="533" cy="438391"/>
+            </a:xfrm>
+            <a:prstGeom prst="straightConnector1">
+              <a:avLst/>
+            </a:prstGeom>
+            <a:ln>
+              <a:tailEnd type="arrow"/>
+            </a:ln>
+          </p:spPr>
+          <p:style>
+            <a:lnRef idx="1">
+              <a:schemeClr val="accent1"/>
+            </a:lnRef>
+            <a:fillRef idx="0">
+              <a:schemeClr val="accent1"/>
+            </a:fillRef>
+            <a:effectRef idx="0">
+              <a:schemeClr val="accent1"/>
+            </a:effectRef>
+            <a:fontRef idx="minor">
+              <a:schemeClr val="tx1"/>
+            </a:fontRef>
+          </p:style>
+        </p:cxnSp>
+        <p:cxnSp>
+          <p:nvCxnSpPr>
+            <p:cNvPr id="25" name="Straight Arrow Connector 24"/>
+            <p:cNvCxnSpPr>
+              <a:stCxn id="12" idx="4"/>
+              <a:endCxn id="27" idx="0"/>
+            </p:cNvCxnSpPr>
+            <p:nvPr/>
+          </p:nvCxnSpPr>
+          <p:spPr>
+            <a:xfrm>
+              <a:off x="1901100" y="3630266"/>
+              <a:ext cx="0" cy="314622"/>
+            </a:xfrm>
+            <a:prstGeom prst="straightConnector1">
+              <a:avLst/>
+            </a:prstGeom>
+            <a:ln>
+              <a:tailEnd type="arrow"/>
+            </a:ln>
+          </p:spPr>
+          <p:style>
+            <a:lnRef idx="1">
+              <a:schemeClr val="accent1"/>
+            </a:lnRef>
+            <a:fillRef idx="0">
+              <a:schemeClr val="accent1"/>
+            </a:fillRef>
+            <a:effectRef idx="0">
+              <a:schemeClr val="accent1"/>
+            </a:effectRef>
+            <a:fontRef idx="minor">
+              <a:schemeClr val="tx1"/>
+            </a:fontRef>
+          </p:style>
+        </p:cxnSp>
+        <p:sp>
+          <p:nvSpPr>
+            <p:cNvPr id="26" name="Rectangle 25"/>
+            <p:cNvSpPr/>
+            <p:nvPr/>
+          </p:nvSpPr>
+          <p:spPr>
+            <a:xfrm>
+              <a:off x="4279495" y="3024816"/>
+              <a:ext cx="854786" cy="276999"/>
+            </a:xfrm>
+            <a:prstGeom prst="rect">
+              <a:avLst/>
+            </a:prstGeom>
+          </p:spPr>
+          <p:txBody>
+            <a:bodyPr wrap="none">
+              <a:spAutoFit/>
+            </a:bodyPr>
+            <a:lstStyle/>
+            <a:p>
+              <a:r>
+                <a:rPr lang="fr-FR" sz="1200" dirty="0" err="1" smtClean="0"/>
+                <a:t>Gait</a:t>
+              </a:r>
+              <a:r>
+                <a:rPr lang="fr-FR" sz="1200" dirty="0" smtClean="0"/>
+                <a:t> Trial 2</a:t>
+              </a:r>
+              <a:endParaRPr lang="fr-FR" sz="1200" dirty="0"/>
+            </a:p>
+          </p:txBody>
+        </p:sp>
+        <p:sp>
+          <p:nvSpPr>
+            <p:cNvPr id="27" name="Rectangle 26"/>
+            <p:cNvSpPr/>
+            <p:nvPr/>
+          </p:nvSpPr>
+          <p:spPr>
+            <a:xfrm>
+              <a:off x="1539751" y="3944888"/>
+              <a:ext cx="722698" cy="276999"/>
+            </a:xfrm>
+            <a:prstGeom prst="rect">
+              <a:avLst/>
+            </a:prstGeom>
+          </p:spPr>
+          <p:txBody>
+            <a:bodyPr wrap="none">
+              <a:spAutoFit/>
+            </a:bodyPr>
+            <a:lstStyle/>
+            <a:p>
+              <a:r>
+                <a:rPr lang="fr-FR" sz="1200" b="1" i="1" dirty="0" err="1">
+                  <a:solidFill>
+                    <a:srgbClr val="FFC000"/>
+                  </a:solidFill>
+                  <a:effectLst>
+                    <a:outerShdw blurRad="38100" dist="38100" dir="2700000" algn="tl">
+                      <a:srgbClr val="000000">
+                        <a:alpha val="43137"/>
+                      </a:srgbClr>
+                    </a:outerShdw>
+                  </a:effectLst>
+                </a:rPr>
+                <a:t>optional</a:t>
+              </a:r>
+              <a:endParaRPr lang="fr-FR" b="1" i="1" dirty="0">
+                <a:solidFill>
+                  <a:srgbClr val="FFC000"/>
+                </a:solidFill>
+                <a:effectLst>
+                  <a:outerShdw blurRad="38100" dist="38100" dir="2700000" algn="tl">
+                    <a:srgbClr val="000000">
+                      <a:alpha val="43137"/>
+                    </a:srgbClr>
+                  </a:outerShdw>
+                </a:effectLst>
+              </a:endParaRPr>
+            </a:p>
+          </p:txBody>
+        </p:sp>
+      </p:grpSp>
+    </p:spTree>
+    <p:extLst>
+      <p:ext uri="{BB962C8B-B14F-4D97-AF65-F5344CB8AC3E}">
+        <p14:creationId xmlns:p14="http://schemas.microsoft.com/office/powerpoint/2010/main" val="2304716998"/>
+      </p:ext>
+    </p:extLst>
+  </p:cSld>
+  <p:clrMapOvr>
+    <a:masterClrMapping/>
+  </p:clrMapOvr>
+</p:sld>
+</file>
+
 <file path=ppt/theme/theme1.xml><?xml version="1.0" encoding="utf-8"?>
 <a:theme xmlns:a="http://schemas.openxmlformats.org/drawingml/2006/main" name="Office Theme">
   <a:themeElements>

</xml_diff>